<commit_message>
speech_stage_fbx 파일 업로드 // 발표준비
</commit_message>
<xml_diff>
--- a/기획문서/UI.pptx
+++ b/기획문서/UI.pptx
@@ -198,7 +198,7 @@
           <a:p>
             <a:fld id="{D5B3D382-BA18-47F4-BD86-E894B4DFE9BE}" type="datetimeFigureOut">
               <a:rPr lang="ko-KR" altLang="en-US" smtClean="0"/>
-              <a:t>2016-04-26</a:t>
+              <a:t>2016-04-29</a:t>
             </a:fld>
             <a:endParaRPr lang="ko-KR" altLang="en-US"/>
           </a:p>
@@ -899,7 +899,7 @@
           <a:p>
             <a:fld id="{79BB124B-F906-483B-ACF5-0CC29D8DBA7D}" type="datetimeFigureOut">
               <a:rPr lang="ko-KR" altLang="en-US" smtClean="0"/>
-              <a:t>2016-04-26</a:t>
+              <a:t>2016-04-29</a:t>
             </a:fld>
             <a:endParaRPr lang="ko-KR" altLang="en-US"/>
           </a:p>
@@ -1069,7 +1069,7 @@
           <a:p>
             <a:fld id="{79BB124B-F906-483B-ACF5-0CC29D8DBA7D}" type="datetimeFigureOut">
               <a:rPr lang="ko-KR" altLang="en-US" smtClean="0"/>
-              <a:t>2016-04-26</a:t>
+              <a:t>2016-04-29</a:t>
             </a:fld>
             <a:endParaRPr lang="ko-KR" altLang="en-US"/>
           </a:p>
@@ -1249,7 +1249,7 @@
           <a:p>
             <a:fld id="{79BB124B-F906-483B-ACF5-0CC29D8DBA7D}" type="datetimeFigureOut">
               <a:rPr lang="ko-KR" altLang="en-US" smtClean="0"/>
-              <a:t>2016-04-26</a:t>
+              <a:t>2016-04-29</a:t>
             </a:fld>
             <a:endParaRPr lang="ko-KR" altLang="en-US"/>
           </a:p>
@@ -1419,7 +1419,7 @@
           <a:p>
             <a:fld id="{79BB124B-F906-483B-ACF5-0CC29D8DBA7D}" type="datetimeFigureOut">
               <a:rPr lang="ko-KR" altLang="en-US" smtClean="0"/>
-              <a:t>2016-04-26</a:t>
+              <a:t>2016-04-29</a:t>
             </a:fld>
             <a:endParaRPr lang="ko-KR" altLang="en-US"/>
           </a:p>
@@ -1665,7 +1665,7 @@
           <a:p>
             <a:fld id="{79BB124B-F906-483B-ACF5-0CC29D8DBA7D}" type="datetimeFigureOut">
               <a:rPr lang="ko-KR" altLang="en-US" smtClean="0"/>
-              <a:t>2016-04-26</a:t>
+              <a:t>2016-04-29</a:t>
             </a:fld>
             <a:endParaRPr lang="ko-KR" altLang="en-US"/>
           </a:p>
@@ -1953,7 +1953,7 @@
           <a:p>
             <a:fld id="{79BB124B-F906-483B-ACF5-0CC29D8DBA7D}" type="datetimeFigureOut">
               <a:rPr lang="ko-KR" altLang="en-US" smtClean="0"/>
-              <a:t>2016-04-26</a:t>
+              <a:t>2016-04-29</a:t>
             </a:fld>
             <a:endParaRPr lang="ko-KR" altLang="en-US"/>
           </a:p>
@@ -2380,7 +2380,7 @@
           <a:p>
             <a:fld id="{79BB124B-F906-483B-ACF5-0CC29D8DBA7D}" type="datetimeFigureOut">
               <a:rPr lang="ko-KR" altLang="en-US" smtClean="0"/>
-              <a:t>2016-04-26</a:t>
+              <a:t>2016-04-29</a:t>
             </a:fld>
             <a:endParaRPr lang="ko-KR" altLang="en-US"/>
           </a:p>
@@ -2498,7 +2498,7 @@
           <a:p>
             <a:fld id="{79BB124B-F906-483B-ACF5-0CC29D8DBA7D}" type="datetimeFigureOut">
               <a:rPr lang="ko-KR" altLang="en-US" smtClean="0"/>
-              <a:t>2016-04-26</a:t>
+              <a:t>2016-04-29</a:t>
             </a:fld>
             <a:endParaRPr lang="ko-KR" altLang="en-US"/>
           </a:p>
@@ -2593,7 +2593,7 @@
           <a:p>
             <a:fld id="{79BB124B-F906-483B-ACF5-0CC29D8DBA7D}" type="datetimeFigureOut">
               <a:rPr lang="ko-KR" altLang="en-US" smtClean="0"/>
-              <a:t>2016-04-26</a:t>
+              <a:t>2016-04-29</a:t>
             </a:fld>
             <a:endParaRPr lang="ko-KR" altLang="en-US"/>
           </a:p>
@@ -2870,7 +2870,7 @@
           <a:p>
             <a:fld id="{79BB124B-F906-483B-ACF5-0CC29D8DBA7D}" type="datetimeFigureOut">
               <a:rPr lang="ko-KR" altLang="en-US" smtClean="0"/>
-              <a:t>2016-04-26</a:t>
+              <a:t>2016-04-29</a:t>
             </a:fld>
             <a:endParaRPr lang="ko-KR" altLang="en-US"/>
           </a:p>
@@ -3123,7 +3123,7 @@
           <a:p>
             <a:fld id="{79BB124B-F906-483B-ACF5-0CC29D8DBA7D}" type="datetimeFigureOut">
               <a:rPr lang="ko-KR" altLang="en-US" smtClean="0"/>
-              <a:t>2016-04-26</a:t>
+              <a:t>2016-04-29</a:t>
             </a:fld>
             <a:endParaRPr lang="ko-KR" altLang="en-US"/>
           </a:p>
@@ -3336,7 +3336,7 @@
           <a:p>
             <a:fld id="{79BB124B-F906-483B-ACF5-0CC29D8DBA7D}" type="datetimeFigureOut">
               <a:rPr lang="ko-KR" altLang="en-US" smtClean="0"/>
-              <a:t>2016-04-26</a:t>
+              <a:t>2016-04-29</a:t>
             </a:fld>
             <a:endParaRPr lang="ko-KR" altLang="en-US"/>
           </a:p>
@@ -8090,16 +8090,16 @@
       </p:grpSpPr>
       <p:grpSp>
         <p:nvGrpSpPr>
-          <p:cNvPr id="6" name="Group 5"/>
+          <p:cNvPr id="8" name="Group 7"/>
           <p:cNvGrpSpPr/>
           <p:nvPr/>
         </p:nvGrpSpPr>
         <p:grpSpPr>
           <a:xfrm>
-            <a:off x="1" y="-25693"/>
-            <a:ext cx="24164638" cy="15148218"/>
-            <a:chOff x="1764681" y="1080542"/>
-            <a:chExt cx="20841183" cy="13064826"/>
+            <a:off x="1476649" y="870967"/>
+            <a:ext cx="22687990" cy="14251557"/>
+            <a:chOff x="1" y="-25693"/>
+            <a:chExt cx="24164638" cy="15148218"/>
           </a:xfrm>
         </p:grpSpPr>
         <p:sp>
@@ -8110,8 +8110,8 @@
           </p:nvSpPr>
           <p:spPr>
             <a:xfrm>
-              <a:off x="1764681" y="1080542"/>
-              <a:ext cx="20841183" cy="13064826"/>
+              <a:off x="1" y="-25693"/>
+              <a:ext cx="24164638" cy="15148218"/>
             </a:xfrm>
             <a:prstGeom prst="roundRect">
               <a:avLst>
@@ -8187,8 +8187,8 @@
           </p:nvSpPr>
           <p:spPr>
             <a:xfrm>
-              <a:off x="2140156" y="2736726"/>
-              <a:ext cx="20090232" cy="11122155"/>
+              <a:off x="435351" y="1894596"/>
+              <a:ext cx="23293936" cy="12895758"/>
             </a:xfrm>
             <a:prstGeom prst="roundRect">
               <a:avLst>
@@ -8261,8 +8261,8 @@
           </p:nvSpPr>
           <p:spPr>
             <a:xfrm>
-              <a:off x="2135319" y="1272580"/>
-              <a:ext cx="20090232" cy="720080"/>
+              <a:off x="429743" y="196968"/>
+              <a:ext cx="23293936" cy="834908"/>
             </a:xfrm>
             <a:prstGeom prst="roundRect">
               <a:avLst>
@@ -8335,8 +8335,8 @@
           </p:nvCxnSpPr>
           <p:spPr>
             <a:xfrm>
-              <a:off x="2844803" y="6553150"/>
-              <a:ext cx="18794088" cy="0"/>
+              <a:off x="1252365" y="6319608"/>
+              <a:ext cx="21791101" cy="0"/>
             </a:xfrm>
             <a:prstGeom prst="line">
               <a:avLst/>
@@ -8365,306 +8365,6 @@
             </a:fontRef>
           </p:style>
         </p:cxnSp>
-        <p:grpSp>
-          <p:nvGrpSpPr>
-            <p:cNvPr id="5" name="Group 4"/>
-            <p:cNvGrpSpPr/>
-            <p:nvPr/>
-          </p:nvGrpSpPr>
-          <p:grpSpPr>
-            <a:xfrm>
-              <a:off x="21300251" y="1451481"/>
-              <a:ext cx="891188" cy="913216"/>
-              <a:chOff x="21300251" y="1451481"/>
-              <a:chExt cx="891188" cy="913216"/>
-            </a:xfrm>
-          </p:grpSpPr>
-          <p:sp>
-            <p:nvSpPr>
-              <p:cNvPr id="100" name="Rounded Rectangle 99"/>
-              <p:cNvSpPr/>
-              <p:nvPr/>
-            </p:nvSpPr>
-            <p:spPr>
-              <a:xfrm>
-                <a:off x="21300251" y="1474312"/>
-                <a:ext cx="891188" cy="890385"/>
-              </a:xfrm>
-              <a:prstGeom prst="roundRect">
-                <a:avLst>
-                  <a:gd name="adj" fmla="val 11628"/>
-                </a:avLst>
-              </a:prstGeom>
-              <a:solidFill>
-                <a:schemeClr val="accent2">
-                  <a:lumMod val="75000"/>
-                </a:schemeClr>
-              </a:solidFill>
-              <a:ln>
-                <a:noFill/>
-              </a:ln>
-              <a:effectLst>
-                <a:outerShdw blurRad="101600" dist="38100" dir="5400000" algn="t" rotWithShape="0">
-                  <a:schemeClr val="tx1">
-                    <a:lumMod val="75000"/>
-                    <a:lumOff val="25000"/>
-                    <a:alpha val="40000"/>
-                  </a:schemeClr>
-                </a:outerShdw>
-                <a:softEdge rad="12700"/>
-              </a:effectLst>
-              <a:scene3d>
-                <a:camera prst="orthographicFront"/>
-                <a:lightRig rig="threePt" dir="t"/>
-              </a:scene3d>
-              <a:sp3d>
-                <a:contourClr>
-                  <a:schemeClr val="bg1"/>
-                </a:contourClr>
-              </a:sp3d>
-            </p:spPr>
-            <p:style>
-              <a:lnRef idx="2">
-                <a:schemeClr val="accent1">
-                  <a:shade val="50000"/>
-                </a:schemeClr>
-              </a:lnRef>
-              <a:fillRef idx="1">
-                <a:schemeClr val="accent1"/>
-              </a:fillRef>
-              <a:effectRef idx="0">
-                <a:schemeClr val="accent1"/>
-              </a:effectRef>
-              <a:fontRef idx="minor">
-                <a:schemeClr val="lt1"/>
-              </a:fontRef>
-            </p:style>
-            <p:txBody>
-              <a:bodyPr rtlCol="0" anchor="ctr"/>
-              <a:lstStyle/>
-              <a:p>
-                <a:pPr algn="ctr"/>
-                <a:endParaRPr lang="ko-KR" altLang="en-US"/>
-              </a:p>
-            </p:txBody>
-          </p:sp>
-          <p:sp>
-            <p:nvSpPr>
-              <p:cNvPr id="101" name="Rounded Rectangle 100"/>
-              <p:cNvSpPr/>
-              <p:nvPr/>
-            </p:nvSpPr>
-            <p:spPr>
-              <a:xfrm>
-                <a:off x="21300251" y="1451481"/>
-                <a:ext cx="891188" cy="890385"/>
-              </a:xfrm>
-              <a:prstGeom prst="roundRect">
-                <a:avLst>
-                  <a:gd name="adj" fmla="val 11628"/>
-                </a:avLst>
-              </a:prstGeom>
-              <a:solidFill>
-                <a:schemeClr val="accent2">
-                  <a:lumMod val="60000"/>
-                  <a:lumOff val="40000"/>
-                  <a:alpha val="70000"/>
-                </a:schemeClr>
-              </a:solidFill>
-              <a:ln>
-                <a:noFill/>
-              </a:ln>
-              <a:effectLst>
-                <a:softEdge rad="12700"/>
-              </a:effectLst>
-              <a:scene3d>
-                <a:camera prst="orthographicFront"/>
-                <a:lightRig rig="threePt" dir="t"/>
-              </a:scene3d>
-              <a:sp3d>
-                <a:contourClr>
-                  <a:schemeClr val="bg1"/>
-                </a:contourClr>
-              </a:sp3d>
-            </p:spPr>
-            <p:style>
-              <a:lnRef idx="2">
-                <a:schemeClr val="accent1">
-                  <a:shade val="50000"/>
-                </a:schemeClr>
-              </a:lnRef>
-              <a:fillRef idx="1">
-                <a:schemeClr val="accent1"/>
-              </a:fillRef>
-              <a:effectRef idx="0">
-                <a:schemeClr val="accent1"/>
-              </a:effectRef>
-              <a:fontRef idx="minor">
-                <a:schemeClr val="lt1"/>
-              </a:fontRef>
-            </p:style>
-            <p:txBody>
-              <a:bodyPr rtlCol="0" anchor="ctr"/>
-              <a:lstStyle/>
-              <a:p>
-                <a:pPr algn="ctr"/>
-                <a:endParaRPr lang="ko-KR" altLang="en-US"/>
-              </a:p>
-            </p:txBody>
-          </p:sp>
-          <p:sp>
-            <p:nvSpPr>
-              <p:cNvPr id="102" name="Rounded Rectangle 101"/>
-              <p:cNvSpPr/>
-              <p:nvPr/>
-            </p:nvSpPr>
-            <p:spPr>
-              <a:xfrm>
-                <a:off x="21335550" y="1497142"/>
-                <a:ext cx="820589" cy="399532"/>
-              </a:xfrm>
-              <a:prstGeom prst="roundRect">
-                <a:avLst/>
-              </a:prstGeom>
-              <a:solidFill>
-                <a:schemeClr val="bg1">
-                  <a:lumMod val="95000"/>
-                  <a:alpha val="29000"/>
-                </a:schemeClr>
-              </a:solidFill>
-              <a:ln>
-                <a:noFill/>
-              </a:ln>
-            </p:spPr>
-            <p:style>
-              <a:lnRef idx="2">
-                <a:schemeClr val="accent1">
-                  <a:shade val="50000"/>
-                </a:schemeClr>
-              </a:lnRef>
-              <a:fillRef idx="1">
-                <a:schemeClr val="accent1"/>
-              </a:fillRef>
-              <a:effectRef idx="0">
-                <a:schemeClr val="accent1"/>
-              </a:effectRef>
-              <a:fontRef idx="minor">
-                <a:schemeClr val="lt1"/>
-              </a:fontRef>
-            </p:style>
-            <p:txBody>
-              <a:bodyPr rtlCol="0" anchor="ctr"/>
-              <a:lstStyle/>
-              <a:p>
-                <a:pPr algn="ctr"/>
-                <a:endParaRPr lang="ko-KR" altLang="en-US"/>
-              </a:p>
-            </p:txBody>
-          </p:sp>
-          <p:sp>
-            <p:nvSpPr>
-              <p:cNvPr id="103" name="Oval 102"/>
-              <p:cNvSpPr/>
-              <p:nvPr/>
-            </p:nvSpPr>
-            <p:spPr>
-              <a:xfrm rot="19229300">
-                <a:off x="22087541" y="1506995"/>
-                <a:ext cx="37642" cy="67930"/>
-              </a:xfrm>
-              <a:prstGeom prst="ellipse">
-                <a:avLst/>
-              </a:prstGeom>
-              <a:solidFill>
-                <a:schemeClr val="bg1"/>
-              </a:solidFill>
-              <a:ln>
-                <a:noFill/>
-              </a:ln>
-            </p:spPr>
-            <p:style>
-              <a:lnRef idx="2">
-                <a:schemeClr val="accent1">
-                  <a:shade val="50000"/>
-                </a:schemeClr>
-              </a:lnRef>
-              <a:fillRef idx="1">
-                <a:schemeClr val="accent1"/>
-              </a:fillRef>
-              <a:effectRef idx="0">
-                <a:schemeClr val="accent1"/>
-              </a:effectRef>
-              <a:fontRef idx="minor">
-                <a:schemeClr val="lt1"/>
-              </a:fontRef>
-            </p:style>
-            <p:txBody>
-              <a:bodyPr rtlCol="0" anchor="ctr"/>
-              <a:lstStyle/>
-              <a:p>
-                <a:pPr algn="ctr"/>
-                <a:endParaRPr lang="ko-KR" altLang="en-US"/>
-              </a:p>
-            </p:txBody>
-          </p:sp>
-          <p:sp>
-            <p:nvSpPr>
-              <p:cNvPr id="104" name="Multiply 103"/>
-              <p:cNvSpPr/>
-              <p:nvPr/>
-            </p:nvSpPr>
-            <p:spPr>
-              <a:xfrm>
-                <a:off x="21322128" y="1497142"/>
-                <a:ext cx="864446" cy="864446"/>
-              </a:xfrm>
-              <a:prstGeom prst="mathMultiply">
-                <a:avLst>
-                  <a:gd name="adj1" fmla="val 22051"/>
-                </a:avLst>
-              </a:prstGeom>
-              <a:solidFill>
-                <a:schemeClr val="accent2">
-                  <a:lumMod val="50000"/>
-                </a:schemeClr>
-              </a:solidFill>
-              <a:ln>
-                <a:noFill/>
-              </a:ln>
-              <a:scene3d>
-                <a:camera prst="orthographicFront"/>
-                <a:lightRig rig="threePt" dir="t"/>
-              </a:scene3d>
-              <a:sp3d>
-                <a:bevelT w="38100" h="38100" prst="angle"/>
-              </a:sp3d>
-            </p:spPr>
-            <p:style>
-              <a:lnRef idx="2">
-                <a:schemeClr val="accent1">
-                  <a:shade val="50000"/>
-                </a:schemeClr>
-              </a:lnRef>
-              <a:fillRef idx="1">
-                <a:schemeClr val="accent1"/>
-              </a:fillRef>
-              <a:effectRef idx="0">
-                <a:schemeClr val="accent1"/>
-              </a:effectRef>
-              <a:fontRef idx="minor">
-                <a:schemeClr val="lt1"/>
-              </a:fontRef>
-            </p:style>
-            <p:txBody>
-              <a:bodyPr rtlCol="0" anchor="ctr"/>
-              <a:lstStyle/>
-              <a:p>
-                <a:pPr algn="ctr"/>
-                <a:endParaRPr lang="ko-KR" altLang="en-US"/>
-              </a:p>
-            </p:txBody>
-          </p:sp>
-        </p:grpSp>
         <p:sp>
           <p:nvSpPr>
             <p:cNvPr id="107" name="TextBox 106"/>
@@ -8673,8 +8373,8 @@
           </p:nvSpPr>
           <p:spPr>
             <a:xfrm>
-              <a:off x="8789382" y="1502781"/>
-              <a:ext cx="6904929" cy="1015663"/>
+              <a:off x="8144901" y="463879"/>
+              <a:ext cx="8006029" cy="1177626"/>
             </a:xfrm>
             <a:prstGeom prst="rect">
               <a:avLst/>
@@ -8710,8 +8410,8 @@
           </p:nvSpPr>
           <p:spPr>
             <a:xfrm rot="19229300">
-              <a:off x="22045957" y="1286901"/>
-              <a:ext cx="127948" cy="230898"/>
+              <a:off x="23515446" y="213573"/>
+              <a:ext cx="148351" cy="267718"/>
             </a:xfrm>
             <a:prstGeom prst="ellipse">
               <a:avLst/>
@@ -8751,28 +8451,28 @@
       </p:grpSp>
       <p:grpSp>
         <p:nvGrpSpPr>
-          <p:cNvPr id="97" name="Group 96"/>
+          <p:cNvPr id="17" name="Group 16"/>
           <p:cNvGrpSpPr/>
           <p:nvPr/>
         </p:nvGrpSpPr>
         <p:grpSpPr>
           <a:xfrm>
-            <a:off x="1252365" y="2744781"/>
-            <a:ext cx="3029196" cy="3104070"/>
-            <a:chOff x="3103941" y="2947155"/>
-            <a:chExt cx="3029196" cy="3104070"/>
+            <a:off x="180505" y="132457"/>
+            <a:ext cx="1033302" cy="1058843"/>
+            <a:chOff x="21300251" y="1451481"/>
+            <a:chExt cx="891188" cy="913216"/>
           </a:xfrm>
         </p:grpSpPr>
         <p:sp>
           <p:nvSpPr>
-            <p:cNvPr id="98" name="Rounded Rectangle 97"/>
+            <p:cNvPr id="19" name="Rounded Rectangle 18"/>
             <p:cNvSpPr/>
             <p:nvPr/>
           </p:nvSpPr>
           <p:spPr>
             <a:xfrm>
-              <a:off x="3103941" y="3024758"/>
-              <a:ext cx="3029195" cy="3026467"/>
+              <a:off x="21300251" y="1474312"/>
+              <a:ext cx="891188" cy="890385"/>
             </a:xfrm>
             <a:prstGeom prst="roundRect">
               <a:avLst>
@@ -8780,9 +8480,8 @@
               </a:avLst>
             </a:prstGeom>
             <a:solidFill>
-              <a:schemeClr val="tx2">
-                <a:lumMod val="60000"/>
-                <a:lumOff val="40000"/>
+              <a:schemeClr val="accent2">
+                <a:lumMod val="75000"/>
               </a:schemeClr>
             </a:solidFill>
             <a:ln>
@@ -8835,14 +8534,14 @@
         </p:sp>
         <p:sp>
           <p:nvSpPr>
-            <p:cNvPr id="99" name="Rounded Rectangle 98"/>
+            <p:cNvPr id="20" name="Rounded Rectangle 19"/>
             <p:cNvSpPr/>
             <p:nvPr/>
           </p:nvSpPr>
           <p:spPr>
             <a:xfrm>
-              <a:off x="3103942" y="2947155"/>
-              <a:ext cx="3029195" cy="3026467"/>
+              <a:off x="21300251" y="1451481"/>
+              <a:ext cx="891188" cy="890385"/>
             </a:xfrm>
             <a:prstGeom prst="roundRect">
               <a:avLst>
@@ -8850,9 +8549,10 @@
               </a:avLst>
             </a:prstGeom>
             <a:solidFill>
-              <a:schemeClr val="accent1">
+              <a:schemeClr val="accent2">
                 <a:lumMod val="60000"/>
                 <a:lumOff val="40000"/>
+                <a:alpha val="70000"/>
               </a:schemeClr>
             </a:solidFill>
             <a:ln>
@@ -8898,14 +8598,14 @@
         </p:sp>
         <p:sp>
           <p:nvSpPr>
-            <p:cNvPr id="109" name="Rounded Rectangle 108"/>
+            <p:cNvPr id="21" name="Rounded Rectangle 20"/>
             <p:cNvSpPr/>
             <p:nvPr/>
           </p:nvSpPr>
           <p:spPr>
             <a:xfrm>
-              <a:off x="3223925" y="3102360"/>
-              <a:ext cx="2789227" cy="1358029"/>
+              <a:off x="21335550" y="1497142"/>
+              <a:ext cx="820589" cy="399532"/>
             </a:xfrm>
             <a:prstGeom prst="roundRect">
               <a:avLst/>
@@ -8947,14 +8647,14 @@
         </p:sp>
         <p:sp>
           <p:nvSpPr>
-            <p:cNvPr id="112" name="Oval 111"/>
+            <p:cNvPr id="22" name="Oval 21"/>
             <p:cNvSpPr/>
             <p:nvPr/>
           </p:nvSpPr>
           <p:spPr>
             <a:xfrm rot="19229300">
-              <a:off x="5779983" y="3135849"/>
-              <a:ext cx="127948" cy="230898"/>
+              <a:off x="22087541" y="1506995"/>
+              <a:ext cx="37642" cy="67930"/>
             </a:xfrm>
             <a:prstGeom prst="ellipse">
               <a:avLst/>
@@ -8965,91 +8665,6 @@
             <a:ln>
               <a:noFill/>
             </a:ln>
-          </p:spPr>
-          <p:style>
-            <a:lnRef idx="2">
-              <a:schemeClr val="accent1">
-                <a:shade val="50000"/>
-              </a:schemeClr>
-            </a:lnRef>
-            <a:fillRef idx="1">
-              <a:schemeClr val="accent1"/>
-            </a:fillRef>
-            <a:effectRef idx="0">
-              <a:schemeClr val="accent1"/>
-            </a:effectRef>
-            <a:fontRef idx="minor">
-              <a:schemeClr val="lt1"/>
-            </a:fontRef>
-          </p:style>
-          <p:txBody>
-            <a:bodyPr rtlCol="0" anchor="ctr"/>
-            <a:lstStyle/>
-            <a:p>
-              <a:pPr algn="ctr"/>
-              <a:endParaRPr lang="ko-KR" altLang="en-US"/>
-            </a:p>
-          </p:txBody>
-        </p:sp>
-      </p:grpSp>
-      <p:grpSp>
-        <p:nvGrpSpPr>
-          <p:cNvPr id="116" name="Group 115"/>
-          <p:cNvGrpSpPr/>
-          <p:nvPr/>
-        </p:nvGrpSpPr>
-        <p:grpSpPr>
-          <a:xfrm>
-            <a:off x="5031912" y="2744781"/>
-            <a:ext cx="3029196" cy="3104070"/>
-            <a:chOff x="3103941" y="2947155"/>
-            <a:chExt cx="3029196" cy="3104070"/>
-          </a:xfrm>
-        </p:grpSpPr>
-        <p:sp>
-          <p:nvSpPr>
-            <p:cNvPr id="117" name="Rounded Rectangle 116"/>
-            <p:cNvSpPr/>
-            <p:nvPr/>
-          </p:nvSpPr>
-          <p:spPr>
-            <a:xfrm>
-              <a:off x="3103941" y="3024758"/>
-              <a:ext cx="3029195" cy="3026467"/>
-            </a:xfrm>
-            <a:prstGeom prst="roundRect">
-              <a:avLst>
-                <a:gd name="adj" fmla="val 11628"/>
-              </a:avLst>
-            </a:prstGeom>
-            <a:solidFill>
-              <a:schemeClr val="tx2">
-                <a:lumMod val="60000"/>
-                <a:lumOff val="40000"/>
-              </a:schemeClr>
-            </a:solidFill>
-            <a:ln>
-              <a:noFill/>
-            </a:ln>
-            <a:effectLst>
-              <a:outerShdw blurRad="101600" dist="38100" dir="5400000" algn="t" rotWithShape="0">
-                <a:schemeClr val="tx1">
-                  <a:lumMod val="75000"/>
-                  <a:lumOff val="25000"/>
-                  <a:alpha val="40000"/>
-                </a:schemeClr>
-              </a:outerShdw>
-              <a:softEdge rad="12700"/>
-            </a:effectLst>
-            <a:scene3d>
-              <a:camera prst="orthographicFront"/>
-              <a:lightRig rig="threePt" dir="t"/>
-            </a:scene3d>
-            <a:sp3d>
-              <a:contourClr>
-                <a:schemeClr val="bg1"/>
-              </a:contourClr>
-            </a:sp3d>
           </p:spPr>
           <p:style>
             <a:lnRef idx="2">
@@ -9078,1108 +8693,35 @@
         </p:sp>
         <p:sp>
           <p:nvSpPr>
-            <p:cNvPr id="118" name="Rounded Rectangle 117"/>
+            <p:cNvPr id="23" name="Multiply 22"/>
             <p:cNvSpPr/>
             <p:nvPr/>
           </p:nvSpPr>
           <p:spPr>
             <a:xfrm>
-              <a:off x="3103942" y="2947155"/>
-              <a:ext cx="3029195" cy="3026467"/>
+              <a:off x="21322128" y="1497142"/>
+              <a:ext cx="864446" cy="864446"/>
             </a:xfrm>
-            <a:prstGeom prst="roundRect">
+            <a:prstGeom prst="mathMultiply">
               <a:avLst>
-                <a:gd name="adj" fmla="val 11628"/>
+                <a:gd name="adj1" fmla="val 22051"/>
               </a:avLst>
             </a:prstGeom>
             <a:solidFill>
-              <a:schemeClr val="accent1">
-                <a:lumMod val="60000"/>
-                <a:lumOff val="40000"/>
+              <a:schemeClr val="accent2">
+                <a:lumMod val="50000"/>
               </a:schemeClr>
             </a:solidFill>
             <a:ln>
               <a:noFill/>
             </a:ln>
-            <a:effectLst>
-              <a:softEdge rad="12700"/>
-            </a:effectLst>
             <a:scene3d>
               <a:camera prst="orthographicFront"/>
               <a:lightRig rig="threePt" dir="t"/>
             </a:scene3d>
             <a:sp3d>
-              <a:contourClr>
-                <a:schemeClr val="bg1"/>
-              </a:contourClr>
+              <a:bevelT w="38100" h="38100" prst="angle"/>
             </a:sp3d>
-          </p:spPr>
-          <p:style>
-            <a:lnRef idx="2">
-              <a:schemeClr val="accent1">
-                <a:shade val="50000"/>
-              </a:schemeClr>
-            </a:lnRef>
-            <a:fillRef idx="1">
-              <a:schemeClr val="accent1"/>
-            </a:fillRef>
-            <a:effectRef idx="0">
-              <a:schemeClr val="accent1"/>
-            </a:effectRef>
-            <a:fontRef idx="minor">
-              <a:schemeClr val="lt1"/>
-            </a:fontRef>
-          </p:style>
-          <p:txBody>
-            <a:bodyPr rtlCol="0" anchor="ctr"/>
-            <a:lstStyle/>
-            <a:p>
-              <a:pPr algn="ctr"/>
-              <a:endParaRPr lang="ko-KR" altLang="en-US"/>
-            </a:p>
-          </p:txBody>
-        </p:sp>
-        <p:sp>
-          <p:nvSpPr>
-            <p:cNvPr id="119" name="Rounded Rectangle 118"/>
-            <p:cNvSpPr/>
-            <p:nvPr/>
-          </p:nvSpPr>
-          <p:spPr>
-            <a:xfrm>
-              <a:off x="3223925" y="3102360"/>
-              <a:ext cx="2789227" cy="1358029"/>
-            </a:xfrm>
-            <a:prstGeom prst="roundRect">
-              <a:avLst/>
-            </a:prstGeom>
-            <a:solidFill>
-              <a:schemeClr val="bg1">
-                <a:lumMod val="95000"/>
-                <a:alpha val="29000"/>
-              </a:schemeClr>
-            </a:solidFill>
-            <a:ln>
-              <a:noFill/>
-            </a:ln>
-          </p:spPr>
-          <p:style>
-            <a:lnRef idx="2">
-              <a:schemeClr val="accent1">
-                <a:shade val="50000"/>
-              </a:schemeClr>
-            </a:lnRef>
-            <a:fillRef idx="1">
-              <a:schemeClr val="accent1"/>
-            </a:fillRef>
-            <a:effectRef idx="0">
-              <a:schemeClr val="accent1"/>
-            </a:effectRef>
-            <a:fontRef idx="minor">
-              <a:schemeClr val="lt1"/>
-            </a:fontRef>
-          </p:style>
-          <p:txBody>
-            <a:bodyPr rtlCol="0" anchor="ctr"/>
-            <a:lstStyle/>
-            <a:p>
-              <a:pPr algn="ctr"/>
-              <a:endParaRPr lang="ko-KR" altLang="en-US"/>
-            </a:p>
-          </p:txBody>
-        </p:sp>
-        <p:sp>
-          <p:nvSpPr>
-            <p:cNvPr id="120" name="Oval 119"/>
-            <p:cNvSpPr/>
-            <p:nvPr/>
-          </p:nvSpPr>
-          <p:spPr>
-            <a:xfrm rot="19229300">
-              <a:off x="5779983" y="3135849"/>
-              <a:ext cx="127948" cy="230898"/>
-            </a:xfrm>
-            <a:prstGeom prst="ellipse">
-              <a:avLst/>
-            </a:prstGeom>
-            <a:solidFill>
-              <a:schemeClr val="bg1"/>
-            </a:solidFill>
-            <a:ln>
-              <a:noFill/>
-            </a:ln>
-          </p:spPr>
-          <p:style>
-            <a:lnRef idx="2">
-              <a:schemeClr val="accent1">
-                <a:shade val="50000"/>
-              </a:schemeClr>
-            </a:lnRef>
-            <a:fillRef idx="1">
-              <a:schemeClr val="accent1"/>
-            </a:fillRef>
-            <a:effectRef idx="0">
-              <a:schemeClr val="accent1"/>
-            </a:effectRef>
-            <a:fontRef idx="minor">
-              <a:schemeClr val="lt1"/>
-            </a:fontRef>
-          </p:style>
-          <p:txBody>
-            <a:bodyPr rtlCol="0" anchor="ctr"/>
-            <a:lstStyle/>
-            <a:p>
-              <a:pPr algn="ctr"/>
-              <a:endParaRPr lang="ko-KR" altLang="en-US"/>
-            </a:p>
-          </p:txBody>
-        </p:sp>
-      </p:grpSp>
-      <p:grpSp>
-        <p:nvGrpSpPr>
-          <p:cNvPr id="121" name="Group 120"/>
-          <p:cNvGrpSpPr/>
-          <p:nvPr/>
-        </p:nvGrpSpPr>
-        <p:grpSpPr>
-          <a:xfrm>
-            <a:off x="8811459" y="2744781"/>
-            <a:ext cx="3029196" cy="3104070"/>
-            <a:chOff x="3103941" y="2947155"/>
-            <a:chExt cx="3029196" cy="3104070"/>
-          </a:xfrm>
-        </p:grpSpPr>
-        <p:sp>
-          <p:nvSpPr>
-            <p:cNvPr id="122" name="Rounded Rectangle 121"/>
-            <p:cNvSpPr/>
-            <p:nvPr/>
-          </p:nvSpPr>
-          <p:spPr>
-            <a:xfrm>
-              <a:off x="3103941" y="3024758"/>
-              <a:ext cx="3029195" cy="3026467"/>
-            </a:xfrm>
-            <a:prstGeom prst="roundRect">
-              <a:avLst>
-                <a:gd name="adj" fmla="val 11628"/>
-              </a:avLst>
-            </a:prstGeom>
-            <a:solidFill>
-              <a:schemeClr val="tx2">
-                <a:lumMod val="60000"/>
-                <a:lumOff val="40000"/>
-              </a:schemeClr>
-            </a:solidFill>
-            <a:ln>
-              <a:noFill/>
-            </a:ln>
-            <a:effectLst>
-              <a:outerShdw blurRad="101600" dist="38100" dir="5400000" algn="t" rotWithShape="0">
-                <a:schemeClr val="tx1">
-                  <a:lumMod val="75000"/>
-                  <a:lumOff val="25000"/>
-                  <a:alpha val="40000"/>
-                </a:schemeClr>
-              </a:outerShdw>
-              <a:softEdge rad="12700"/>
-            </a:effectLst>
-            <a:scene3d>
-              <a:camera prst="orthographicFront"/>
-              <a:lightRig rig="threePt" dir="t"/>
-            </a:scene3d>
-            <a:sp3d>
-              <a:contourClr>
-                <a:schemeClr val="bg1"/>
-              </a:contourClr>
-            </a:sp3d>
-          </p:spPr>
-          <p:style>
-            <a:lnRef idx="2">
-              <a:schemeClr val="accent1">
-                <a:shade val="50000"/>
-              </a:schemeClr>
-            </a:lnRef>
-            <a:fillRef idx="1">
-              <a:schemeClr val="accent1"/>
-            </a:fillRef>
-            <a:effectRef idx="0">
-              <a:schemeClr val="accent1"/>
-            </a:effectRef>
-            <a:fontRef idx="minor">
-              <a:schemeClr val="lt1"/>
-            </a:fontRef>
-          </p:style>
-          <p:txBody>
-            <a:bodyPr rtlCol="0" anchor="ctr"/>
-            <a:lstStyle/>
-            <a:p>
-              <a:pPr algn="ctr"/>
-              <a:endParaRPr lang="ko-KR" altLang="en-US"/>
-            </a:p>
-          </p:txBody>
-        </p:sp>
-        <p:sp>
-          <p:nvSpPr>
-            <p:cNvPr id="123" name="Rounded Rectangle 122"/>
-            <p:cNvSpPr/>
-            <p:nvPr/>
-          </p:nvSpPr>
-          <p:spPr>
-            <a:xfrm>
-              <a:off x="3103942" y="2947155"/>
-              <a:ext cx="3029195" cy="3026467"/>
-            </a:xfrm>
-            <a:prstGeom prst="roundRect">
-              <a:avLst>
-                <a:gd name="adj" fmla="val 11628"/>
-              </a:avLst>
-            </a:prstGeom>
-            <a:solidFill>
-              <a:schemeClr val="accent1">
-                <a:lumMod val="60000"/>
-                <a:lumOff val="40000"/>
-              </a:schemeClr>
-            </a:solidFill>
-            <a:ln>
-              <a:noFill/>
-            </a:ln>
-            <a:effectLst>
-              <a:softEdge rad="12700"/>
-            </a:effectLst>
-            <a:scene3d>
-              <a:camera prst="orthographicFront"/>
-              <a:lightRig rig="threePt" dir="t"/>
-            </a:scene3d>
-            <a:sp3d>
-              <a:contourClr>
-                <a:schemeClr val="bg1"/>
-              </a:contourClr>
-            </a:sp3d>
-          </p:spPr>
-          <p:style>
-            <a:lnRef idx="2">
-              <a:schemeClr val="accent1">
-                <a:shade val="50000"/>
-              </a:schemeClr>
-            </a:lnRef>
-            <a:fillRef idx="1">
-              <a:schemeClr val="accent1"/>
-            </a:fillRef>
-            <a:effectRef idx="0">
-              <a:schemeClr val="accent1"/>
-            </a:effectRef>
-            <a:fontRef idx="minor">
-              <a:schemeClr val="lt1"/>
-            </a:fontRef>
-          </p:style>
-          <p:txBody>
-            <a:bodyPr rtlCol="0" anchor="ctr"/>
-            <a:lstStyle/>
-            <a:p>
-              <a:pPr algn="ctr"/>
-              <a:endParaRPr lang="ko-KR" altLang="en-US"/>
-            </a:p>
-          </p:txBody>
-        </p:sp>
-        <p:sp>
-          <p:nvSpPr>
-            <p:cNvPr id="124" name="Rounded Rectangle 123"/>
-            <p:cNvSpPr/>
-            <p:nvPr/>
-          </p:nvSpPr>
-          <p:spPr>
-            <a:xfrm>
-              <a:off x="3223925" y="3102360"/>
-              <a:ext cx="2789227" cy="1358029"/>
-            </a:xfrm>
-            <a:prstGeom prst="roundRect">
-              <a:avLst/>
-            </a:prstGeom>
-            <a:solidFill>
-              <a:schemeClr val="bg1">
-                <a:lumMod val="95000"/>
-                <a:alpha val="29000"/>
-              </a:schemeClr>
-            </a:solidFill>
-            <a:ln>
-              <a:noFill/>
-            </a:ln>
-          </p:spPr>
-          <p:style>
-            <a:lnRef idx="2">
-              <a:schemeClr val="accent1">
-                <a:shade val="50000"/>
-              </a:schemeClr>
-            </a:lnRef>
-            <a:fillRef idx="1">
-              <a:schemeClr val="accent1"/>
-            </a:fillRef>
-            <a:effectRef idx="0">
-              <a:schemeClr val="accent1"/>
-            </a:effectRef>
-            <a:fontRef idx="minor">
-              <a:schemeClr val="lt1"/>
-            </a:fontRef>
-          </p:style>
-          <p:txBody>
-            <a:bodyPr rtlCol="0" anchor="ctr"/>
-            <a:lstStyle/>
-            <a:p>
-              <a:pPr algn="ctr"/>
-              <a:endParaRPr lang="ko-KR" altLang="en-US"/>
-            </a:p>
-          </p:txBody>
-        </p:sp>
-        <p:sp>
-          <p:nvSpPr>
-            <p:cNvPr id="125" name="Oval 124"/>
-            <p:cNvSpPr/>
-            <p:nvPr/>
-          </p:nvSpPr>
-          <p:spPr>
-            <a:xfrm rot="19229300">
-              <a:off x="5779983" y="3135849"/>
-              <a:ext cx="127948" cy="230898"/>
-            </a:xfrm>
-            <a:prstGeom prst="ellipse">
-              <a:avLst/>
-            </a:prstGeom>
-            <a:solidFill>
-              <a:schemeClr val="bg1"/>
-            </a:solidFill>
-            <a:ln>
-              <a:noFill/>
-            </a:ln>
-          </p:spPr>
-          <p:style>
-            <a:lnRef idx="2">
-              <a:schemeClr val="accent1">
-                <a:shade val="50000"/>
-              </a:schemeClr>
-            </a:lnRef>
-            <a:fillRef idx="1">
-              <a:schemeClr val="accent1"/>
-            </a:fillRef>
-            <a:effectRef idx="0">
-              <a:schemeClr val="accent1"/>
-            </a:effectRef>
-            <a:fontRef idx="minor">
-              <a:schemeClr val="lt1"/>
-            </a:fontRef>
-          </p:style>
-          <p:txBody>
-            <a:bodyPr rtlCol="0" anchor="ctr"/>
-            <a:lstStyle/>
-            <a:p>
-              <a:pPr algn="ctr"/>
-              <a:endParaRPr lang="ko-KR" altLang="en-US"/>
-            </a:p>
-          </p:txBody>
-        </p:sp>
-      </p:grpSp>
-      <p:grpSp>
-        <p:nvGrpSpPr>
-          <p:cNvPr id="126" name="Group 125"/>
-          <p:cNvGrpSpPr/>
-          <p:nvPr/>
-        </p:nvGrpSpPr>
-        <p:grpSpPr>
-          <a:xfrm>
-            <a:off x="16370553" y="2744781"/>
-            <a:ext cx="3029196" cy="3104070"/>
-            <a:chOff x="3103941" y="2947155"/>
-            <a:chExt cx="3029196" cy="3104070"/>
-          </a:xfrm>
-        </p:grpSpPr>
-        <p:sp>
-          <p:nvSpPr>
-            <p:cNvPr id="127" name="Rounded Rectangle 126"/>
-            <p:cNvSpPr/>
-            <p:nvPr/>
-          </p:nvSpPr>
-          <p:spPr>
-            <a:xfrm>
-              <a:off x="3103941" y="3024758"/>
-              <a:ext cx="3029195" cy="3026467"/>
-            </a:xfrm>
-            <a:prstGeom prst="roundRect">
-              <a:avLst>
-                <a:gd name="adj" fmla="val 11628"/>
-              </a:avLst>
-            </a:prstGeom>
-            <a:solidFill>
-              <a:schemeClr val="tx2">
-                <a:lumMod val="60000"/>
-                <a:lumOff val="40000"/>
-              </a:schemeClr>
-            </a:solidFill>
-            <a:ln>
-              <a:noFill/>
-            </a:ln>
-            <a:effectLst>
-              <a:outerShdw blurRad="101600" dist="38100" dir="5400000" algn="t" rotWithShape="0">
-                <a:schemeClr val="tx1">
-                  <a:lumMod val="75000"/>
-                  <a:lumOff val="25000"/>
-                  <a:alpha val="40000"/>
-                </a:schemeClr>
-              </a:outerShdw>
-              <a:softEdge rad="12700"/>
-            </a:effectLst>
-            <a:scene3d>
-              <a:camera prst="orthographicFront"/>
-              <a:lightRig rig="threePt" dir="t"/>
-            </a:scene3d>
-            <a:sp3d>
-              <a:contourClr>
-                <a:schemeClr val="bg1"/>
-              </a:contourClr>
-            </a:sp3d>
-          </p:spPr>
-          <p:style>
-            <a:lnRef idx="2">
-              <a:schemeClr val="accent1">
-                <a:shade val="50000"/>
-              </a:schemeClr>
-            </a:lnRef>
-            <a:fillRef idx="1">
-              <a:schemeClr val="accent1"/>
-            </a:fillRef>
-            <a:effectRef idx="0">
-              <a:schemeClr val="accent1"/>
-            </a:effectRef>
-            <a:fontRef idx="minor">
-              <a:schemeClr val="lt1"/>
-            </a:fontRef>
-          </p:style>
-          <p:txBody>
-            <a:bodyPr rtlCol="0" anchor="ctr"/>
-            <a:lstStyle/>
-            <a:p>
-              <a:pPr algn="ctr"/>
-              <a:endParaRPr lang="ko-KR" altLang="en-US"/>
-            </a:p>
-          </p:txBody>
-        </p:sp>
-        <p:sp>
-          <p:nvSpPr>
-            <p:cNvPr id="128" name="Rounded Rectangle 127"/>
-            <p:cNvSpPr/>
-            <p:nvPr/>
-          </p:nvSpPr>
-          <p:spPr>
-            <a:xfrm>
-              <a:off x="3103942" y="2947155"/>
-              <a:ext cx="3029195" cy="3026467"/>
-            </a:xfrm>
-            <a:prstGeom prst="roundRect">
-              <a:avLst>
-                <a:gd name="adj" fmla="val 11628"/>
-              </a:avLst>
-            </a:prstGeom>
-            <a:solidFill>
-              <a:schemeClr val="accent1">
-                <a:lumMod val="60000"/>
-                <a:lumOff val="40000"/>
-              </a:schemeClr>
-            </a:solidFill>
-            <a:ln>
-              <a:noFill/>
-            </a:ln>
-            <a:effectLst>
-              <a:softEdge rad="12700"/>
-            </a:effectLst>
-            <a:scene3d>
-              <a:camera prst="orthographicFront"/>
-              <a:lightRig rig="threePt" dir="t"/>
-            </a:scene3d>
-            <a:sp3d>
-              <a:contourClr>
-                <a:schemeClr val="bg1"/>
-              </a:contourClr>
-            </a:sp3d>
-          </p:spPr>
-          <p:style>
-            <a:lnRef idx="2">
-              <a:schemeClr val="accent1">
-                <a:shade val="50000"/>
-              </a:schemeClr>
-            </a:lnRef>
-            <a:fillRef idx="1">
-              <a:schemeClr val="accent1"/>
-            </a:fillRef>
-            <a:effectRef idx="0">
-              <a:schemeClr val="accent1"/>
-            </a:effectRef>
-            <a:fontRef idx="minor">
-              <a:schemeClr val="lt1"/>
-            </a:fontRef>
-          </p:style>
-          <p:txBody>
-            <a:bodyPr rtlCol="0" anchor="ctr"/>
-            <a:lstStyle/>
-            <a:p>
-              <a:pPr algn="ctr"/>
-              <a:endParaRPr lang="ko-KR" altLang="en-US"/>
-            </a:p>
-          </p:txBody>
-        </p:sp>
-        <p:sp>
-          <p:nvSpPr>
-            <p:cNvPr id="129" name="Rounded Rectangle 128"/>
-            <p:cNvSpPr/>
-            <p:nvPr/>
-          </p:nvSpPr>
-          <p:spPr>
-            <a:xfrm>
-              <a:off x="3223925" y="3102360"/>
-              <a:ext cx="2789227" cy="1358029"/>
-            </a:xfrm>
-            <a:prstGeom prst="roundRect">
-              <a:avLst/>
-            </a:prstGeom>
-            <a:solidFill>
-              <a:schemeClr val="bg1">
-                <a:lumMod val="95000"/>
-                <a:alpha val="29000"/>
-              </a:schemeClr>
-            </a:solidFill>
-            <a:ln>
-              <a:noFill/>
-            </a:ln>
-          </p:spPr>
-          <p:style>
-            <a:lnRef idx="2">
-              <a:schemeClr val="accent1">
-                <a:shade val="50000"/>
-              </a:schemeClr>
-            </a:lnRef>
-            <a:fillRef idx="1">
-              <a:schemeClr val="accent1"/>
-            </a:fillRef>
-            <a:effectRef idx="0">
-              <a:schemeClr val="accent1"/>
-            </a:effectRef>
-            <a:fontRef idx="minor">
-              <a:schemeClr val="lt1"/>
-            </a:fontRef>
-          </p:style>
-          <p:txBody>
-            <a:bodyPr rtlCol="0" anchor="ctr"/>
-            <a:lstStyle/>
-            <a:p>
-              <a:pPr algn="ctr"/>
-              <a:endParaRPr lang="ko-KR" altLang="en-US"/>
-            </a:p>
-          </p:txBody>
-        </p:sp>
-        <p:sp>
-          <p:nvSpPr>
-            <p:cNvPr id="130" name="Oval 129"/>
-            <p:cNvSpPr/>
-            <p:nvPr/>
-          </p:nvSpPr>
-          <p:spPr>
-            <a:xfrm rot="19229300">
-              <a:off x="5779983" y="3135849"/>
-              <a:ext cx="127948" cy="230898"/>
-            </a:xfrm>
-            <a:prstGeom prst="ellipse">
-              <a:avLst/>
-            </a:prstGeom>
-            <a:solidFill>
-              <a:schemeClr val="bg1"/>
-            </a:solidFill>
-            <a:ln>
-              <a:noFill/>
-            </a:ln>
-          </p:spPr>
-          <p:style>
-            <a:lnRef idx="2">
-              <a:schemeClr val="accent1">
-                <a:shade val="50000"/>
-              </a:schemeClr>
-            </a:lnRef>
-            <a:fillRef idx="1">
-              <a:schemeClr val="accent1"/>
-            </a:fillRef>
-            <a:effectRef idx="0">
-              <a:schemeClr val="accent1"/>
-            </a:effectRef>
-            <a:fontRef idx="minor">
-              <a:schemeClr val="lt1"/>
-            </a:fontRef>
-          </p:style>
-          <p:txBody>
-            <a:bodyPr rtlCol="0" anchor="ctr"/>
-            <a:lstStyle/>
-            <a:p>
-              <a:pPr algn="ctr"/>
-              <a:endParaRPr lang="ko-KR" altLang="en-US"/>
-            </a:p>
-          </p:txBody>
-        </p:sp>
-      </p:grpSp>
-      <p:grpSp>
-        <p:nvGrpSpPr>
-          <p:cNvPr id="131" name="Group 130"/>
-          <p:cNvGrpSpPr/>
-          <p:nvPr/>
-        </p:nvGrpSpPr>
-        <p:grpSpPr>
-          <a:xfrm>
-            <a:off x="20150102" y="2744781"/>
-            <a:ext cx="3029196" cy="3104070"/>
-            <a:chOff x="3103941" y="2947155"/>
-            <a:chExt cx="3029196" cy="3104070"/>
-          </a:xfrm>
-        </p:grpSpPr>
-        <p:sp>
-          <p:nvSpPr>
-            <p:cNvPr id="132" name="Rounded Rectangle 131"/>
-            <p:cNvSpPr/>
-            <p:nvPr/>
-          </p:nvSpPr>
-          <p:spPr>
-            <a:xfrm>
-              <a:off x="3103941" y="3024758"/>
-              <a:ext cx="3029195" cy="3026467"/>
-            </a:xfrm>
-            <a:prstGeom prst="roundRect">
-              <a:avLst>
-                <a:gd name="adj" fmla="val 11628"/>
-              </a:avLst>
-            </a:prstGeom>
-            <a:solidFill>
-              <a:schemeClr val="tx2">
-                <a:lumMod val="60000"/>
-                <a:lumOff val="40000"/>
-              </a:schemeClr>
-            </a:solidFill>
-            <a:ln>
-              <a:noFill/>
-            </a:ln>
-            <a:effectLst>
-              <a:outerShdw blurRad="101600" dist="38100" dir="5400000" algn="t" rotWithShape="0">
-                <a:schemeClr val="tx1">
-                  <a:lumMod val="75000"/>
-                  <a:lumOff val="25000"/>
-                  <a:alpha val="40000"/>
-                </a:schemeClr>
-              </a:outerShdw>
-              <a:softEdge rad="12700"/>
-            </a:effectLst>
-            <a:scene3d>
-              <a:camera prst="orthographicFront"/>
-              <a:lightRig rig="threePt" dir="t"/>
-            </a:scene3d>
-            <a:sp3d>
-              <a:contourClr>
-                <a:schemeClr val="bg1"/>
-              </a:contourClr>
-            </a:sp3d>
-          </p:spPr>
-          <p:style>
-            <a:lnRef idx="2">
-              <a:schemeClr val="accent1">
-                <a:shade val="50000"/>
-              </a:schemeClr>
-            </a:lnRef>
-            <a:fillRef idx="1">
-              <a:schemeClr val="accent1"/>
-            </a:fillRef>
-            <a:effectRef idx="0">
-              <a:schemeClr val="accent1"/>
-            </a:effectRef>
-            <a:fontRef idx="minor">
-              <a:schemeClr val="lt1"/>
-            </a:fontRef>
-          </p:style>
-          <p:txBody>
-            <a:bodyPr rtlCol="0" anchor="ctr"/>
-            <a:lstStyle/>
-            <a:p>
-              <a:pPr algn="ctr"/>
-              <a:endParaRPr lang="ko-KR" altLang="en-US"/>
-            </a:p>
-          </p:txBody>
-        </p:sp>
-        <p:sp>
-          <p:nvSpPr>
-            <p:cNvPr id="133" name="Rounded Rectangle 132"/>
-            <p:cNvSpPr/>
-            <p:nvPr/>
-          </p:nvSpPr>
-          <p:spPr>
-            <a:xfrm>
-              <a:off x="3103942" y="2947155"/>
-              <a:ext cx="3029195" cy="3026467"/>
-            </a:xfrm>
-            <a:prstGeom prst="roundRect">
-              <a:avLst>
-                <a:gd name="adj" fmla="val 11628"/>
-              </a:avLst>
-            </a:prstGeom>
-            <a:solidFill>
-              <a:schemeClr val="accent1">
-                <a:lumMod val="60000"/>
-                <a:lumOff val="40000"/>
-              </a:schemeClr>
-            </a:solidFill>
-            <a:ln>
-              <a:noFill/>
-            </a:ln>
-            <a:effectLst>
-              <a:softEdge rad="12700"/>
-            </a:effectLst>
-            <a:scene3d>
-              <a:camera prst="orthographicFront"/>
-              <a:lightRig rig="threePt" dir="t"/>
-            </a:scene3d>
-            <a:sp3d>
-              <a:contourClr>
-                <a:schemeClr val="bg1"/>
-              </a:contourClr>
-            </a:sp3d>
-          </p:spPr>
-          <p:style>
-            <a:lnRef idx="2">
-              <a:schemeClr val="accent1">
-                <a:shade val="50000"/>
-              </a:schemeClr>
-            </a:lnRef>
-            <a:fillRef idx="1">
-              <a:schemeClr val="accent1"/>
-            </a:fillRef>
-            <a:effectRef idx="0">
-              <a:schemeClr val="accent1"/>
-            </a:effectRef>
-            <a:fontRef idx="minor">
-              <a:schemeClr val="lt1"/>
-            </a:fontRef>
-          </p:style>
-          <p:txBody>
-            <a:bodyPr rtlCol="0" anchor="ctr"/>
-            <a:lstStyle/>
-            <a:p>
-              <a:pPr algn="ctr"/>
-              <a:endParaRPr lang="ko-KR" altLang="en-US"/>
-            </a:p>
-          </p:txBody>
-        </p:sp>
-        <p:sp>
-          <p:nvSpPr>
-            <p:cNvPr id="134" name="Rounded Rectangle 133"/>
-            <p:cNvSpPr/>
-            <p:nvPr/>
-          </p:nvSpPr>
-          <p:spPr>
-            <a:xfrm>
-              <a:off x="3223925" y="3102360"/>
-              <a:ext cx="2789227" cy="1358029"/>
-            </a:xfrm>
-            <a:prstGeom prst="roundRect">
-              <a:avLst/>
-            </a:prstGeom>
-            <a:solidFill>
-              <a:schemeClr val="bg1">
-                <a:lumMod val="95000"/>
-                <a:alpha val="29000"/>
-              </a:schemeClr>
-            </a:solidFill>
-            <a:ln>
-              <a:noFill/>
-            </a:ln>
-          </p:spPr>
-          <p:style>
-            <a:lnRef idx="2">
-              <a:schemeClr val="accent1">
-                <a:shade val="50000"/>
-              </a:schemeClr>
-            </a:lnRef>
-            <a:fillRef idx="1">
-              <a:schemeClr val="accent1"/>
-            </a:fillRef>
-            <a:effectRef idx="0">
-              <a:schemeClr val="accent1"/>
-            </a:effectRef>
-            <a:fontRef idx="minor">
-              <a:schemeClr val="lt1"/>
-            </a:fontRef>
-          </p:style>
-          <p:txBody>
-            <a:bodyPr rtlCol="0" anchor="ctr"/>
-            <a:lstStyle/>
-            <a:p>
-              <a:pPr algn="ctr"/>
-              <a:endParaRPr lang="ko-KR" altLang="en-US"/>
-            </a:p>
-          </p:txBody>
-        </p:sp>
-        <p:sp>
-          <p:nvSpPr>
-            <p:cNvPr id="135" name="Oval 134"/>
-            <p:cNvSpPr/>
-            <p:nvPr/>
-          </p:nvSpPr>
-          <p:spPr>
-            <a:xfrm rot="19229300">
-              <a:off x="5779983" y="3135849"/>
-              <a:ext cx="127948" cy="230898"/>
-            </a:xfrm>
-            <a:prstGeom prst="ellipse">
-              <a:avLst/>
-            </a:prstGeom>
-            <a:solidFill>
-              <a:schemeClr val="bg1"/>
-            </a:solidFill>
-            <a:ln>
-              <a:noFill/>
-            </a:ln>
-          </p:spPr>
-          <p:style>
-            <a:lnRef idx="2">
-              <a:schemeClr val="accent1">
-                <a:shade val="50000"/>
-              </a:schemeClr>
-            </a:lnRef>
-            <a:fillRef idx="1">
-              <a:schemeClr val="accent1"/>
-            </a:fillRef>
-            <a:effectRef idx="0">
-              <a:schemeClr val="accent1"/>
-            </a:effectRef>
-            <a:fontRef idx="minor">
-              <a:schemeClr val="lt1"/>
-            </a:fontRef>
-          </p:style>
-          <p:txBody>
-            <a:bodyPr rtlCol="0" anchor="ctr"/>
-            <a:lstStyle/>
-            <a:p>
-              <a:pPr algn="ctr"/>
-              <a:endParaRPr lang="ko-KR" altLang="en-US"/>
-            </a:p>
-          </p:txBody>
-        </p:sp>
-      </p:grpSp>
-      <p:grpSp>
-        <p:nvGrpSpPr>
-          <p:cNvPr id="156" name="Group 155"/>
-          <p:cNvGrpSpPr/>
-          <p:nvPr/>
-        </p:nvGrpSpPr>
-        <p:grpSpPr>
-          <a:xfrm>
-            <a:off x="12591006" y="2744781"/>
-            <a:ext cx="3029196" cy="3104070"/>
-            <a:chOff x="3103941" y="2947155"/>
-            <a:chExt cx="3029196" cy="3104070"/>
-          </a:xfrm>
-        </p:grpSpPr>
-        <p:sp>
-          <p:nvSpPr>
-            <p:cNvPr id="157" name="Rounded Rectangle 156"/>
-            <p:cNvSpPr/>
-            <p:nvPr/>
-          </p:nvSpPr>
-          <p:spPr>
-            <a:xfrm>
-              <a:off x="3103941" y="3024758"/>
-              <a:ext cx="3029195" cy="3026467"/>
-            </a:xfrm>
-            <a:prstGeom prst="roundRect">
-              <a:avLst>
-                <a:gd name="adj" fmla="val 11628"/>
-              </a:avLst>
-            </a:prstGeom>
-            <a:solidFill>
-              <a:schemeClr val="tx2">
-                <a:lumMod val="60000"/>
-                <a:lumOff val="40000"/>
-              </a:schemeClr>
-            </a:solidFill>
-            <a:ln>
-              <a:noFill/>
-            </a:ln>
-            <a:effectLst>
-              <a:outerShdw blurRad="101600" dist="38100" dir="5400000" algn="t" rotWithShape="0">
-                <a:schemeClr val="tx1">
-                  <a:lumMod val="75000"/>
-                  <a:lumOff val="25000"/>
-                  <a:alpha val="40000"/>
-                </a:schemeClr>
-              </a:outerShdw>
-              <a:softEdge rad="12700"/>
-            </a:effectLst>
-            <a:scene3d>
-              <a:camera prst="orthographicFront"/>
-              <a:lightRig rig="threePt" dir="t"/>
-            </a:scene3d>
-            <a:sp3d>
-              <a:contourClr>
-                <a:schemeClr val="bg1"/>
-              </a:contourClr>
-            </a:sp3d>
-          </p:spPr>
-          <p:style>
-            <a:lnRef idx="2">
-              <a:schemeClr val="accent1">
-                <a:shade val="50000"/>
-              </a:schemeClr>
-            </a:lnRef>
-            <a:fillRef idx="1">
-              <a:schemeClr val="accent1"/>
-            </a:fillRef>
-            <a:effectRef idx="0">
-              <a:schemeClr val="accent1"/>
-            </a:effectRef>
-            <a:fontRef idx="minor">
-              <a:schemeClr val="lt1"/>
-            </a:fontRef>
-          </p:style>
-          <p:txBody>
-            <a:bodyPr rtlCol="0" anchor="ctr"/>
-            <a:lstStyle/>
-            <a:p>
-              <a:pPr algn="ctr"/>
-              <a:endParaRPr lang="ko-KR" altLang="en-US"/>
-            </a:p>
-          </p:txBody>
-        </p:sp>
-        <p:sp>
-          <p:nvSpPr>
-            <p:cNvPr id="158" name="Rounded Rectangle 157"/>
-            <p:cNvSpPr/>
-            <p:nvPr/>
-          </p:nvSpPr>
-          <p:spPr>
-            <a:xfrm>
-              <a:off x="3103942" y="2947155"/>
-              <a:ext cx="3029195" cy="3026467"/>
-            </a:xfrm>
-            <a:prstGeom prst="roundRect">
-              <a:avLst>
-                <a:gd name="adj" fmla="val 11628"/>
-              </a:avLst>
-            </a:prstGeom>
-            <a:solidFill>
-              <a:schemeClr val="accent1">
-                <a:lumMod val="60000"/>
-                <a:lumOff val="40000"/>
-              </a:schemeClr>
-            </a:solidFill>
-            <a:ln>
-              <a:noFill/>
-            </a:ln>
-            <a:effectLst>
-              <a:softEdge rad="12700"/>
-            </a:effectLst>
-            <a:scene3d>
-              <a:camera prst="orthographicFront"/>
-              <a:lightRig rig="threePt" dir="t"/>
-            </a:scene3d>
-            <a:sp3d>
-              <a:contourClr>
-                <a:schemeClr val="bg1"/>
-              </a:contourClr>
-            </a:sp3d>
-          </p:spPr>
-          <p:style>
-            <a:lnRef idx="2">
-              <a:schemeClr val="accent1">
-                <a:shade val="50000"/>
-              </a:schemeClr>
-            </a:lnRef>
-            <a:fillRef idx="1">
-              <a:schemeClr val="accent1"/>
-            </a:fillRef>
-            <a:effectRef idx="0">
-              <a:schemeClr val="accent1"/>
-            </a:effectRef>
-            <a:fontRef idx="minor">
-              <a:schemeClr val="lt1"/>
-            </a:fontRef>
-          </p:style>
-          <p:txBody>
-            <a:bodyPr rtlCol="0" anchor="ctr"/>
-            <a:lstStyle/>
-            <a:p>
-              <a:pPr algn="ctr"/>
-              <a:endParaRPr lang="ko-KR" altLang="en-US"/>
-            </a:p>
-          </p:txBody>
-        </p:sp>
-        <p:sp>
-          <p:nvSpPr>
-            <p:cNvPr id="159" name="Rounded Rectangle 158"/>
-            <p:cNvSpPr/>
-            <p:nvPr/>
-          </p:nvSpPr>
-          <p:spPr>
-            <a:xfrm>
-              <a:off x="3223925" y="3102360"/>
-              <a:ext cx="2789227" cy="1358029"/>
-            </a:xfrm>
-            <a:prstGeom prst="roundRect">
-              <a:avLst/>
-            </a:prstGeom>
-            <a:solidFill>
-              <a:schemeClr val="bg1">
-                <a:lumMod val="95000"/>
-                <a:alpha val="29000"/>
-              </a:schemeClr>
-            </a:solidFill>
-            <a:ln>
-              <a:noFill/>
-            </a:ln>
-          </p:spPr>
-          <p:style>
-            <a:lnRef idx="2">
-              <a:schemeClr val="accent1">
-                <a:shade val="50000"/>
-              </a:schemeClr>
-            </a:lnRef>
-            <a:fillRef idx="1">
-              <a:schemeClr val="accent1"/>
-            </a:fillRef>
-            <a:effectRef idx="0">
-              <a:schemeClr val="accent1"/>
-            </a:effectRef>
-            <a:fontRef idx="minor">
-              <a:schemeClr val="lt1"/>
-            </a:fontRef>
-          </p:style>
-          <p:txBody>
-            <a:bodyPr rtlCol="0" anchor="ctr"/>
-            <a:lstStyle/>
-            <a:p>
-              <a:pPr algn="ctr"/>
-              <a:endParaRPr lang="ko-KR" altLang="en-US"/>
-            </a:p>
-          </p:txBody>
-        </p:sp>
-        <p:sp>
-          <p:nvSpPr>
-            <p:cNvPr id="160" name="Oval 159"/>
-            <p:cNvSpPr/>
-            <p:nvPr/>
-          </p:nvSpPr>
-          <p:spPr>
-            <a:xfrm rot="19229300">
-              <a:off x="5779983" y="3135849"/>
-              <a:ext cx="127948" cy="230898"/>
-            </a:xfrm>
-            <a:prstGeom prst="ellipse">
-              <a:avLst/>
-            </a:prstGeom>
-            <a:solidFill>
-              <a:schemeClr val="bg1"/>
-            </a:solidFill>
-            <a:ln>
-              <a:noFill/>
-            </a:ln>
           </p:spPr>
           <p:style>
             <a:lnRef idx="2">

</xml_diff>